<commit_message>
Slides with deltT plots
</commit_message>
<xml_diff>
--- a/DiscussionSlides-17-June.pptx
+++ b/DiscussionSlides-17-June.pptx
@@ -19,6 +19,8 @@
     <p:sldId id="266" r:id="rId14"/>
     <p:sldId id="267" r:id="rId15"/>
     <p:sldId id="268" r:id="rId16"/>
+    <p:sldId id="269" r:id="rId17"/>
+    <p:sldId id="270" r:id="rId18"/>
   </p:sldIdLst>
   <p:sldSz cx="10080625" cy="5670550"/>
   <p:notesSz cx="7559675" cy="10691812"/>
@@ -3036,25 +3038,49 @@
               <a:rPr b="0" lang="en-IN" sz="1800" spc="-1" strike="noStrike">
                 <a:latin typeface="Arial"/>
               </a:rPr>
-              <a:t>Click to </a:t>
+              <a:t>Click </a:t>
             </a:r>
             <a:r>
               <a:rPr b="0" lang="en-IN" sz="1800" spc="-1" strike="noStrike">
                 <a:latin typeface="Arial"/>
               </a:rPr>
-              <a:t>edit the </a:t>
+              <a:t>to </a:t>
             </a:r>
             <a:r>
               <a:rPr b="0" lang="en-IN" sz="1800" spc="-1" strike="noStrike">
                 <a:latin typeface="Arial"/>
               </a:rPr>
-              <a:t>title text </a:t>
+              <a:t>edit </a:t>
             </a:r>
             <a:r>
               <a:rPr b="0" lang="en-IN" sz="1800" spc="-1" strike="noStrike">
                 <a:latin typeface="Arial"/>
               </a:rPr>
-              <a:t>format</a:t>
+              <a:t>the </a:t>
+            </a:r>
+            <a:r>
+              <a:rPr b="0" lang="en-IN" sz="1800" spc="-1" strike="noStrike">
+                <a:latin typeface="Arial"/>
+              </a:rPr>
+              <a:t>title </a:t>
+            </a:r>
+            <a:r>
+              <a:rPr b="0" lang="en-IN" sz="1800" spc="-1" strike="noStrike">
+                <a:latin typeface="Arial"/>
+              </a:rPr>
+              <a:t>text </a:t>
+            </a:r>
+            <a:r>
+              <a:rPr b="0" lang="en-IN" sz="1800" spc="-1" strike="noStrike">
+                <a:latin typeface="Arial"/>
+              </a:rPr>
+              <a:t>form</a:t>
+            </a:r>
+            <a:r>
+              <a:rPr b="0" lang="en-IN" sz="1800" spc="-1" strike="noStrike">
+                <a:latin typeface="Arial"/>
+              </a:rPr>
+              <a:t>at</a:t>
             </a:r>
             <a:endParaRPr b="0" lang="en-IN" sz="1800" spc="-1" strike="noStrike">
               <a:latin typeface="Arial"/>
@@ -3406,7 +3432,7 @@
       </p:grpSpPr>
       <p:sp>
         <p:nvSpPr>
-          <p:cNvPr id="176" name="CustomShape 1"/>
+          <p:cNvPr id="181" name="CustomShape 1"/>
           <p:cNvSpPr/>
           <p:nvPr/>
         </p:nvSpPr>
@@ -3432,7 +3458,7 @@
       </p:sp>
       <p:sp>
         <p:nvSpPr>
-          <p:cNvPr id="177" name="CustomShape 2"/>
+          <p:cNvPr id="182" name="CustomShape 2"/>
           <p:cNvSpPr/>
           <p:nvPr/>
         </p:nvSpPr>
@@ -3469,7 +3495,7 @@
               <a:rPr b="0" lang="en-IN" sz="4400" spc="-1" strike="noStrike">
                 <a:latin typeface="Arial"/>
               </a:rPr>
-              <a:t>Layer 1</a:t>
+              <a:t>Layer 7</a:t>
             </a:r>
             <a:endParaRPr b="0" lang="en-IN" sz="4400" spc="-1" strike="noStrike">
               <a:latin typeface="Arial"/>
@@ -3479,13 +3505,13 @@
       </p:sp>
       <p:sp>
         <p:nvSpPr>
-          <p:cNvPr id="178" name="TextShape 3"/>
+          <p:cNvPr id="183" name="TextShape 3"/>
           <p:cNvSpPr txBox="1"/>
           <p:nvPr/>
         </p:nvSpPr>
         <p:spPr>
           <a:xfrm>
-            <a:off x="3384000" y="4968000"/>
+            <a:off x="3456000" y="5017680"/>
             <a:ext cx="3456000" cy="346320"/>
           </a:xfrm>
           <a:prstGeom prst="rect">
@@ -3505,7 +3531,7 @@
               <a:rPr b="0" lang="en-IN" sz="1800" spc="-1" strike="noStrike">
                 <a:latin typeface="Arial"/>
               </a:rPr>
-              <a:t>Hit Pattern in Cross Layer</a:t>
+              <a:t>Hit Pattern in Oblong Layer</a:t>
             </a:r>
             <a:endParaRPr b="0" lang="en-IN" sz="1800" spc="-1" strike="noStrike">
               <a:latin typeface="Arial"/>
@@ -3515,7 +3541,7 @@
       </p:sp>
       <p:sp>
         <p:nvSpPr>
-          <p:cNvPr id="179" name="TextShape 4"/>
+          <p:cNvPr id="184" name="TextShape 4"/>
           <p:cNvSpPr txBox="1"/>
           <p:nvPr/>
         </p:nvSpPr>
@@ -3571,7 +3597,7 @@
       </p:sp>
       <p:pic>
         <p:nvPicPr>
-          <p:cNvPr id="180" name="" descr=""/>
+          <p:cNvPr id="185" name="" descr=""/>
           <p:cNvPicPr/>
           <p:nvPr/>
         </p:nvPicPr>
@@ -3581,8 +3607,8 @@
         </p:blipFill>
         <p:spPr>
           <a:xfrm>
-            <a:off x="1874520" y="1411920"/>
-            <a:ext cx="5109480" cy="3484080"/>
+            <a:off x="2232000" y="1266840"/>
+            <a:ext cx="4893480" cy="3750840"/>
           </a:xfrm>
           <a:prstGeom prst="rect">
             <a:avLst/>
@@ -3622,160 +3648,9 @@
           <a:chExt cx="0" cy="0"/>
         </a:xfrm>
       </p:grpSpPr>
-      <p:sp>
-        <p:nvSpPr>
-          <p:cNvPr id="181" name="CustomShape 1"/>
-          <p:cNvSpPr/>
-          <p:nvPr/>
-        </p:nvSpPr>
-        <p:spPr>
-          <a:xfrm>
-            <a:off x="504000" y="226080"/>
-            <a:ext cx="9071280" cy="946080"/>
-          </a:xfrm>
-          <a:prstGeom prst="rect">
-            <a:avLst/>
-          </a:prstGeom>
-          <a:noFill/>
-          <a:ln>
-            <a:noFill/>
-          </a:ln>
-        </p:spPr>
-        <p:style>
-          <a:lnRef idx="0"/>
-          <a:fillRef idx="0"/>
-          <a:effectRef idx="0"/>
-          <a:fontRef idx="minor"/>
-        </p:style>
-      </p:sp>
-      <p:sp>
-        <p:nvSpPr>
-          <p:cNvPr id="182" name="CustomShape 2"/>
-          <p:cNvSpPr/>
-          <p:nvPr/>
-        </p:nvSpPr>
-        <p:spPr>
-          <a:xfrm>
-            <a:off x="504000" y="-61920"/>
-            <a:ext cx="9071280" cy="946080"/>
-          </a:xfrm>
-          <a:prstGeom prst="rect">
-            <a:avLst/>
-          </a:prstGeom>
-          <a:noFill/>
-          <a:ln>
-            <a:noFill/>
-          </a:ln>
-        </p:spPr>
-        <p:style>
-          <a:lnRef idx="0"/>
-          <a:fillRef idx="0"/>
-          <a:effectRef idx="0"/>
-          <a:fontRef idx="minor"/>
-        </p:style>
-        <p:txBody>
-          <a:bodyPr lIns="0" rIns="0" tIns="0" bIns="0" anchor="ctr">
-            <a:noAutofit/>
-          </a:bodyPr>
-          <a:p>
-            <a:pPr algn="ctr">
-              <a:lnSpc>
-                <a:spcPct val="100000"/>
-              </a:lnSpc>
-            </a:pPr>
-            <a:r>
-              <a:rPr b="0" lang="en-IN" sz="4400" spc="-1" strike="noStrike">
-                <a:latin typeface="Arial"/>
-              </a:rPr>
-              <a:t>Layer 2</a:t>
-            </a:r>
-            <a:endParaRPr b="0" lang="en-IN" sz="4400" spc="-1" strike="noStrike">
-              <a:latin typeface="Arial"/>
-            </a:endParaRPr>
-          </a:p>
-        </p:txBody>
-      </p:sp>
-      <p:sp>
-        <p:nvSpPr>
-          <p:cNvPr id="183" name="TextShape 3"/>
-          <p:cNvSpPr txBox="1"/>
-          <p:nvPr/>
-        </p:nvSpPr>
-        <p:spPr>
-          <a:xfrm>
-            <a:off x="3456000" y="5017680"/>
-            <a:ext cx="3456000" cy="346320"/>
-          </a:xfrm>
-          <a:prstGeom prst="rect">
-            <a:avLst/>
-          </a:prstGeom>
-          <a:noFill/>
-          <a:ln>
-            <a:noFill/>
-          </a:ln>
-        </p:spPr>
-        <p:txBody>
-          <a:bodyPr lIns="90000" rIns="90000" tIns="45000" bIns="45000">
-            <a:noAutofit/>
-          </a:bodyPr>
-          <a:p>
-            <a:r>
-              <a:rPr b="0" lang="en-IN" sz="1800" spc="-1" strike="noStrike">
-                <a:latin typeface="Arial"/>
-              </a:rPr>
-              <a:t>Hit Pattern in Oblong Layer</a:t>
-            </a:r>
-            <a:endParaRPr b="0" lang="en-IN" sz="1800" spc="-1" strike="noStrike">
-              <a:latin typeface="Arial"/>
-            </a:endParaRPr>
-          </a:p>
-        </p:txBody>
-      </p:sp>
-      <p:sp>
-        <p:nvSpPr>
-          <p:cNvPr id="184" name="TextShape 4"/>
-          <p:cNvSpPr txBox="1"/>
-          <p:nvPr/>
-        </p:nvSpPr>
-        <p:spPr>
-          <a:xfrm>
-            <a:off x="864000" y="828000"/>
-            <a:ext cx="8352000" cy="373680"/>
-          </a:xfrm>
-          <a:prstGeom prst="rect">
-            <a:avLst/>
-          </a:prstGeom>
-          <a:noFill/>
-          <a:ln>
-            <a:noFill/>
-          </a:ln>
-        </p:spPr>
-        <p:txBody>
-          <a:bodyPr lIns="90000" rIns="90000" tIns="45000" bIns="45000">
-            <a:noAutofit/>
-          </a:bodyPr>
-          <a:p>
-            <a:r>
-              <a:rPr b="0" lang="en-IN" sz="2000" spc="-1" strike="noStrike">
-                <a:latin typeface="Arial"/>
-              </a:rPr>
-              <a:t>                    </a:t>
-            </a:r>
-            <a:r>
-              <a:rPr b="0" lang="en-IN" sz="2000" spc="-1" strike="noStrike">
-                <a:latin typeface="Arial"/>
-              </a:rPr>
-              <a:t>Reconstructed Hit Points using experimental data</a:t>
-            </a:r>
-            <a:endParaRPr b="0" lang="en-IN" sz="2000" spc="-1" strike="noStrike">
-              <a:latin typeface="Arial"/>
-            </a:endParaRPr>
-          </a:p>
-        </p:txBody>
-      </p:sp>
       <p:pic>
         <p:nvPicPr>
-          <p:cNvPr id="185" name="" descr=""/>
+          <p:cNvPr id="186" name="" descr=""/>
           <p:cNvPicPr/>
           <p:nvPr/>
         </p:nvPicPr>
@@ -3785,8 +3660,271 @@
         </p:blipFill>
         <p:spPr>
           <a:xfrm>
-            <a:off x="2160000" y="1296000"/>
-            <a:ext cx="5384880" cy="3672000"/>
+            <a:off x="288000" y="144000"/>
+            <a:ext cx="2283840" cy="1656000"/>
+          </a:xfrm>
+          <a:prstGeom prst="rect">
+            <a:avLst/>
+          </a:prstGeom>
+          <a:ln>
+            <a:noFill/>
+          </a:ln>
+        </p:spPr>
+      </p:pic>
+      <p:pic>
+        <p:nvPicPr>
+          <p:cNvPr id="187" name="" descr=""/>
+          <p:cNvPicPr/>
+          <p:nvPr/>
+        </p:nvPicPr>
+        <p:blipFill>
+          <a:blip r:embed="rId2"/>
+          <a:stretch/>
+        </p:blipFill>
+        <p:spPr>
+          <a:xfrm>
+            <a:off x="2952000" y="23760"/>
+            <a:ext cx="2423160" cy="1776240"/>
+          </a:xfrm>
+          <a:prstGeom prst="rect">
+            <a:avLst/>
+          </a:prstGeom>
+          <a:ln>
+            <a:noFill/>
+          </a:ln>
+        </p:spPr>
+      </p:pic>
+      <p:pic>
+        <p:nvPicPr>
+          <p:cNvPr id="188" name="" descr=""/>
+          <p:cNvPicPr/>
+          <p:nvPr/>
+        </p:nvPicPr>
+        <p:blipFill>
+          <a:blip r:embed="rId3"/>
+          <a:stretch/>
+        </p:blipFill>
+        <p:spPr>
+          <a:xfrm>
+            <a:off x="5616000" y="0"/>
+            <a:ext cx="2357280" cy="1728000"/>
+          </a:xfrm>
+          <a:prstGeom prst="rect">
+            <a:avLst/>
+          </a:prstGeom>
+          <a:ln>
+            <a:noFill/>
+          </a:ln>
+        </p:spPr>
+      </p:pic>
+      <p:pic>
+        <p:nvPicPr>
+          <p:cNvPr id="189" name="" descr=""/>
+          <p:cNvPicPr/>
+          <p:nvPr/>
+        </p:nvPicPr>
+        <p:blipFill>
+          <a:blip r:embed="rId4"/>
+          <a:stretch/>
+        </p:blipFill>
+        <p:spPr>
+          <a:xfrm>
+            <a:off x="230040" y="1800000"/>
+            <a:ext cx="2433960" cy="1764720"/>
+          </a:xfrm>
+          <a:prstGeom prst="rect">
+            <a:avLst/>
+          </a:prstGeom>
+          <a:ln>
+            <a:noFill/>
+          </a:ln>
+        </p:spPr>
+      </p:pic>
+      <p:pic>
+        <p:nvPicPr>
+          <p:cNvPr id="190" name="" descr=""/>
+          <p:cNvPicPr/>
+          <p:nvPr/>
+        </p:nvPicPr>
+        <p:blipFill>
+          <a:blip r:embed="rId5"/>
+          <a:stretch/>
+        </p:blipFill>
+        <p:spPr>
+          <a:xfrm>
+            <a:off x="2985120" y="1790640"/>
+            <a:ext cx="2390040" cy="1737360"/>
+          </a:xfrm>
+          <a:prstGeom prst="rect">
+            <a:avLst/>
+          </a:prstGeom>
+          <a:ln>
+            <a:noFill/>
+          </a:ln>
+        </p:spPr>
+      </p:pic>
+      <p:pic>
+        <p:nvPicPr>
+          <p:cNvPr id="191" name="" descr=""/>
+          <p:cNvPicPr/>
+          <p:nvPr/>
+        </p:nvPicPr>
+        <p:blipFill>
+          <a:blip r:embed="rId6"/>
+          <a:stretch/>
+        </p:blipFill>
+        <p:spPr>
+          <a:xfrm>
+            <a:off x="5659920" y="1728000"/>
+            <a:ext cx="2332080" cy="1795320"/>
+          </a:xfrm>
+          <a:prstGeom prst="rect">
+            <a:avLst/>
+          </a:prstGeom>
+          <a:ln>
+            <a:noFill/>
+          </a:ln>
+        </p:spPr>
+      </p:pic>
+      <p:pic>
+        <p:nvPicPr>
+          <p:cNvPr id="192" name="" descr=""/>
+          <p:cNvPicPr/>
+          <p:nvPr/>
+        </p:nvPicPr>
+        <p:blipFill>
+          <a:blip r:embed="rId7"/>
+          <a:stretch/>
+        </p:blipFill>
+        <p:spPr>
+          <a:xfrm>
+            <a:off x="216000" y="3687120"/>
+            <a:ext cx="2534760" cy="1784880"/>
+          </a:xfrm>
+          <a:prstGeom prst="rect">
+            <a:avLst/>
+          </a:prstGeom>
+          <a:ln>
+            <a:noFill/>
+          </a:ln>
+        </p:spPr>
+      </p:pic>
+      <p:pic>
+        <p:nvPicPr>
+          <p:cNvPr id="193" name="" descr=""/>
+          <p:cNvPicPr/>
+          <p:nvPr/>
+        </p:nvPicPr>
+        <p:blipFill>
+          <a:blip r:embed="rId8"/>
+          <a:stretch/>
+        </p:blipFill>
+        <p:spPr>
+          <a:xfrm>
+            <a:off x="2940840" y="3610440"/>
+            <a:ext cx="2603160" cy="1861560"/>
+          </a:xfrm>
+          <a:prstGeom prst="rect">
+            <a:avLst/>
+          </a:prstGeom>
+          <a:ln>
+            <a:noFill/>
+          </a:ln>
+        </p:spPr>
+      </p:pic>
+      <p:pic>
+        <p:nvPicPr>
+          <p:cNvPr id="194" name="" descr=""/>
+          <p:cNvPicPr/>
+          <p:nvPr/>
+        </p:nvPicPr>
+        <p:blipFill>
+          <a:blip r:embed="rId9"/>
+          <a:stretch/>
+        </p:blipFill>
+        <p:spPr>
+          <a:xfrm>
+            <a:off x="5760000" y="3600000"/>
+            <a:ext cx="2423880" cy="1773000"/>
+          </a:xfrm>
+          <a:prstGeom prst="rect">
+            <a:avLst/>
+          </a:prstGeom>
+          <a:ln>
+            <a:noFill/>
+          </a:ln>
+        </p:spPr>
+      </p:pic>
+      <p:sp>
+        <p:nvSpPr>
+          <p:cNvPr id="195" name="Line 1"/>
+          <p:cNvSpPr/>
+          <p:nvPr/>
+        </p:nvSpPr>
+        <p:spPr>
+          <a:xfrm>
+            <a:off x="4464000" y="4572000"/>
+            <a:ext cx="0" cy="792000"/>
+          </a:xfrm>
+          <a:prstGeom prst="line">
+            <a:avLst/>
+          </a:prstGeom>
+          <a:ln w="18000">
+            <a:solidFill>
+              <a:srgbClr val="f10d0c"/>
+            </a:solidFill>
+            <a:round/>
+          </a:ln>
+        </p:spPr>
+        <p:style>
+          <a:lnRef idx="0"/>
+          <a:fillRef idx="0"/>
+          <a:effectRef idx="0"/>
+          <a:fontRef idx="minor"/>
+        </p:style>
+      </p:sp>
+      <p:sp>
+        <p:nvSpPr>
+          <p:cNvPr id="196" name="Line 2"/>
+          <p:cNvSpPr/>
+          <p:nvPr/>
+        </p:nvSpPr>
+        <p:spPr>
+          <a:xfrm>
+            <a:off x="6912000" y="4428000"/>
+            <a:ext cx="0" cy="864000"/>
+          </a:xfrm>
+          <a:prstGeom prst="line">
+            <a:avLst/>
+          </a:prstGeom>
+          <a:ln w="18000">
+            <a:solidFill>
+              <a:srgbClr val="f10d0c"/>
+            </a:solidFill>
+            <a:round/>
+          </a:ln>
+        </p:spPr>
+        <p:style>
+          <a:lnRef idx="0"/>
+          <a:fillRef idx="0"/>
+          <a:effectRef idx="0"/>
+          <a:fontRef idx="minor"/>
+        </p:style>
+      </p:sp>
+      <p:pic>
+        <p:nvPicPr>
+          <p:cNvPr id="197" name="" descr=""/>
+          <p:cNvPicPr/>
+          <p:nvPr/>
+        </p:nvPicPr>
+        <p:blipFill>
+          <a:blip r:embed="rId10"/>
+          <a:stretch/>
+        </p:blipFill>
+        <p:spPr>
+          <a:xfrm>
+            <a:off x="7921080" y="1800000"/>
+            <a:ext cx="2159640" cy="1655280"/>
           </a:xfrm>
           <a:prstGeom prst="rect">
             <a:avLst/>
@@ -3828,7 +3966,7 @@
       </p:grpSpPr>
       <p:sp>
         <p:nvSpPr>
-          <p:cNvPr id="186" name="CustomShape 1"/>
+          <p:cNvPr id="198" name="CustomShape 1"/>
           <p:cNvSpPr/>
           <p:nvPr/>
         </p:nvSpPr>
@@ -3854,7 +3992,7 @@
       </p:sp>
       <p:sp>
         <p:nvSpPr>
-          <p:cNvPr id="187" name="CustomShape 2"/>
+          <p:cNvPr id="199" name="CustomShape 2"/>
           <p:cNvSpPr/>
           <p:nvPr/>
         </p:nvSpPr>
@@ -3891,7 +4029,7 @@
               <a:rPr b="0" lang="en-IN" sz="4400" spc="-1" strike="noStrike">
                 <a:latin typeface="Arial"/>
               </a:rPr>
-              <a:t>Layer 3</a:t>
+              <a:t>Layer 1</a:t>
             </a:r>
             <a:endParaRPr b="0" lang="en-IN" sz="4400" spc="-1" strike="noStrike">
               <a:latin typeface="Arial"/>
@@ -3901,7 +4039,7 @@
       </p:sp>
       <p:sp>
         <p:nvSpPr>
-          <p:cNvPr id="188" name="TextShape 3"/>
+          <p:cNvPr id="200" name="TextShape 3"/>
           <p:cNvSpPr txBox="1"/>
           <p:nvPr/>
         </p:nvSpPr>
@@ -3937,7 +4075,7 @@
       </p:sp>
       <p:sp>
         <p:nvSpPr>
-          <p:cNvPr id="189" name="TextShape 4"/>
+          <p:cNvPr id="201" name="TextShape 4"/>
           <p:cNvSpPr txBox="1"/>
           <p:nvPr/>
         </p:nvSpPr>
@@ -3993,7 +4131,7 @@
       </p:sp>
       <p:pic>
         <p:nvPicPr>
-          <p:cNvPr id="190" name="" descr=""/>
+          <p:cNvPr id="202" name="" descr=""/>
           <p:cNvPicPr/>
           <p:nvPr/>
         </p:nvPicPr>
@@ -4003,8 +4141,8 @@
         </p:blipFill>
         <p:spPr>
           <a:xfrm>
-            <a:off x="2160000" y="1296000"/>
-            <a:ext cx="5181480" cy="3533400"/>
+            <a:off x="1874520" y="1411920"/>
+            <a:ext cx="5109480" cy="3484080"/>
           </a:xfrm>
           <a:prstGeom prst="rect">
             <a:avLst/>
@@ -4046,7 +4184,7 @@
       </p:grpSpPr>
       <p:sp>
         <p:nvSpPr>
-          <p:cNvPr id="191" name="CustomShape 1"/>
+          <p:cNvPr id="203" name="CustomShape 1"/>
           <p:cNvSpPr/>
           <p:nvPr/>
         </p:nvSpPr>
@@ -4072,14 +4210,14 @@
       </p:sp>
       <p:sp>
         <p:nvSpPr>
-          <p:cNvPr id="192" name="CustomShape 2"/>
+          <p:cNvPr id="204" name="CustomShape 2"/>
           <p:cNvSpPr/>
           <p:nvPr/>
         </p:nvSpPr>
         <p:spPr>
           <a:xfrm>
-            <a:off x="504000" y="1326600"/>
-            <a:ext cx="9071280" cy="3287880"/>
+            <a:off x="504000" y="-61920"/>
+            <a:ext cx="9071280" cy="946080"/>
           </a:xfrm>
           <a:prstGeom prst="rect">
             <a:avLst/>
@@ -4095,10 +4233,432 @@
           <a:effectRef idx="0"/>
           <a:fontRef idx="minor"/>
         </p:style>
-      </p:sp>
-      <p:sp>
-        <p:nvSpPr>
-          <p:cNvPr id="193" name="TextShape 3"/>
+        <p:txBody>
+          <a:bodyPr lIns="0" rIns="0" tIns="0" bIns="0" anchor="ctr">
+            <a:noAutofit/>
+          </a:bodyPr>
+          <a:p>
+            <a:pPr algn="ctr">
+              <a:lnSpc>
+                <a:spcPct val="100000"/>
+              </a:lnSpc>
+            </a:pPr>
+            <a:r>
+              <a:rPr b="0" lang="en-IN" sz="4400" spc="-1" strike="noStrike">
+                <a:latin typeface="Arial"/>
+              </a:rPr>
+              <a:t>Layer 2</a:t>
+            </a:r>
+            <a:endParaRPr b="0" lang="en-IN" sz="4400" spc="-1" strike="noStrike">
+              <a:latin typeface="Arial"/>
+            </a:endParaRPr>
+          </a:p>
+        </p:txBody>
+      </p:sp>
+      <p:sp>
+        <p:nvSpPr>
+          <p:cNvPr id="205" name="TextShape 3"/>
+          <p:cNvSpPr txBox="1"/>
+          <p:nvPr/>
+        </p:nvSpPr>
+        <p:spPr>
+          <a:xfrm>
+            <a:off x="3456000" y="5017680"/>
+            <a:ext cx="3456000" cy="346320"/>
+          </a:xfrm>
+          <a:prstGeom prst="rect">
+            <a:avLst/>
+          </a:prstGeom>
+          <a:noFill/>
+          <a:ln>
+            <a:noFill/>
+          </a:ln>
+        </p:spPr>
+        <p:txBody>
+          <a:bodyPr lIns="90000" rIns="90000" tIns="45000" bIns="45000">
+            <a:noAutofit/>
+          </a:bodyPr>
+          <a:p>
+            <a:r>
+              <a:rPr b="0" lang="en-IN" sz="1800" spc="-1" strike="noStrike">
+                <a:latin typeface="Arial"/>
+              </a:rPr>
+              <a:t>Hit Pattern in Oblong Layer</a:t>
+            </a:r>
+            <a:endParaRPr b="0" lang="en-IN" sz="1800" spc="-1" strike="noStrike">
+              <a:latin typeface="Arial"/>
+            </a:endParaRPr>
+          </a:p>
+        </p:txBody>
+      </p:sp>
+      <p:sp>
+        <p:nvSpPr>
+          <p:cNvPr id="206" name="TextShape 4"/>
+          <p:cNvSpPr txBox="1"/>
+          <p:nvPr/>
+        </p:nvSpPr>
+        <p:spPr>
+          <a:xfrm>
+            <a:off x="864000" y="828000"/>
+            <a:ext cx="8352000" cy="373680"/>
+          </a:xfrm>
+          <a:prstGeom prst="rect">
+            <a:avLst/>
+          </a:prstGeom>
+          <a:noFill/>
+          <a:ln>
+            <a:noFill/>
+          </a:ln>
+        </p:spPr>
+        <p:txBody>
+          <a:bodyPr lIns="90000" rIns="90000" tIns="45000" bIns="45000">
+            <a:noAutofit/>
+          </a:bodyPr>
+          <a:p>
+            <a:r>
+              <a:rPr b="0" lang="en-IN" sz="2000" spc="-1" strike="noStrike">
+                <a:latin typeface="Arial"/>
+              </a:rPr>
+              <a:t>                    </a:t>
+            </a:r>
+            <a:r>
+              <a:rPr b="0" lang="en-IN" sz="2000" spc="-1" strike="noStrike">
+                <a:latin typeface="Arial"/>
+              </a:rPr>
+              <a:t>Reconstructed Hit Points using experimental data</a:t>
+            </a:r>
+            <a:endParaRPr b="0" lang="en-IN" sz="2000" spc="-1" strike="noStrike">
+              <a:latin typeface="Arial"/>
+            </a:endParaRPr>
+          </a:p>
+        </p:txBody>
+      </p:sp>
+      <p:pic>
+        <p:nvPicPr>
+          <p:cNvPr id="207" name="" descr=""/>
+          <p:cNvPicPr/>
+          <p:nvPr/>
+        </p:nvPicPr>
+        <p:blipFill>
+          <a:blip r:embed="rId1"/>
+          <a:stretch/>
+        </p:blipFill>
+        <p:spPr>
+          <a:xfrm>
+            <a:off x="2160000" y="1296000"/>
+            <a:ext cx="5384880" cy="3672000"/>
+          </a:xfrm>
+          <a:prstGeom prst="rect">
+            <a:avLst/>
+          </a:prstGeom>
+          <a:ln>
+            <a:noFill/>
+          </a:ln>
+        </p:spPr>
+      </p:pic>
+    </p:spTree>
+  </p:cSld>
+  <mc:AlternateContent>
+    <mc:Choice Requires="p14">
+      <p:transition spd="slow" p14:dur="2000"/>
+    </mc:Choice>
+    <mc:Fallback>
+      <p:transition spd="slow"/>
+    </mc:Fallback>
+  </mc:AlternateContent>
+</p:sld>
+</file>
+
+<file path=ppt/slides/slide14.xml><?xml version="1.0" encoding="utf-8"?>
+<p:sld xmlns:a="http://schemas.openxmlformats.org/drawingml/2006/main" xmlns:p="http://schemas.openxmlformats.org/presentationml/2006/main" xmlns:r="http://schemas.openxmlformats.org/officeDocument/2006/relationships" xmlns:p14="http://schemas.microsoft.com/office/powerpoint/2010/main" xmlns:p15="http://schemas.microsoft.com/office/powerpoint/2012/main" xmlns:mc="http://schemas.openxmlformats.org/markup-compatibility/2006">
+  <p:cSld>
+    <p:spTree>
+      <p:nvGrpSpPr>
+        <p:cNvPr id="1" name=""/>
+        <p:cNvGrpSpPr/>
+        <p:nvPr/>
+      </p:nvGrpSpPr>
+      <p:grpSpPr>
+        <a:xfrm>
+          <a:off x="0" y="0"/>
+          <a:ext cx="0" cy="0"/>
+          <a:chOff x="0" y="0"/>
+          <a:chExt cx="0" cy="0"/>
+        </a:xfrm>
+      </p:grpSpPr>
+      <p:sp>
+        <p:nvSpPr>
+          <p:cNvPr id="208" name="CustomShape 1"/>
+          <p:cNvSpPr/>
+          <p:nvPr/>
+        </p:nvSpPr>
+        <p:spPr>
+          <a:xfrm>
+            <a:off x="504000" y="226080"/>
+            <a:ext cx="9071280" cy="946080"/>
+          </a:xfrm>
+          <a:prstGeom prst="rect">
+            <a:avLst/>
+          </a:prstGeom>
+          <a:noFill/>
+          <a:ln>
+            <a:noFill/>
+          </a:ln>
+        </p:spPr>
+        <p:style>
+          <a:lnRef idx="0"/>
+          <a:fillRef idx="0"/>
+          <a:effectRef idx="0"/>
+          <a:fontRef idx="minor"/>
+        </p:style>
+      </p:sp>
+      <p:sp>
+        <p:nvSpPr>
+          <p:cNvPr id="209" name="CustomShape 2"/>
+          <p:cNvSpPr/>
+          <p:nvPr/>
+        </p:nvSpPr>
+        <p:spPr>
+          <a:xfrm>
+            <a:off x="504000" y="-61920"/>
+            <a:ext cx="9071280" cy="946080"/>
+          </a:xfrm>
+          <a:prstGeom prst="rect">
+            <a:avLst/>
+          </a:prstGeom>
+          <a:noFill/>
+          <a:ln>
+            <a:noFill/>
+          </a:ln>
+        </p:spPr>
+        <p:style>
+          <a:lnRef idx="0"/>
+          <a:fillRef idx="0"/>
+          <a:effectRef idx="0"/>
+          <a:fontRef idx="minor"/>
+        </p:style>
+        <p:txBody>
+          <a:bodyPr lIns="0" rIns="0" tIns="0" bIns="0" anchor="ctr">
+            <a:noAutofit/>
+          </a:bodyPr>
+          <a:p>
+            <a:pPr algn="ctr">
+              <a:lnSpc>
+                <a:spcPct val="100000"/>
+              </a:lnSpc>
+            </a:pPr>
+            <a:r>
+              <a:rPr b="0" lang="en-IN" sz="4400" spc="-1" strike="noStrike">
+                <a:latin typeface="Arial"/>
+              </a:rPr>
+              <a:t>Layer 3</a:t>
+            </a:r>
+            <a:endParaRPr b="0" lang="en-IN" sz="4400" spc="-1" strike="noStrike">
+              <a:latin typeface="Arial"/>
+            </a:endParaRPr>
+          </a:p>
+        </p:txBody>
+      </p:sp>
+      <p:sp>
+        <p:nvSpPr>
+          <p:cNvPr id="210" name="TextShape 3"/>
+          <p:cNvSpPr txBox="1"/>
+          <p:nvPr/>
+        </p:nvSpPr>
+        <p:spPr>
+          <a:xfrm>
+            <a:off x="3384000" y="4968000"/>
+            <a:ext cx="3456000" cy="346320"/>
+          </a:xfrm>
+          <a:prstGeom prst="rect">
+            <a:avLst/>
+          </a:prstGeom>
+          <a:noFill/>
+          <a:ln>
+            <a:noFill/>
+          </a:ln>
+        </p:spPr>
+        <p:txBody>
+          <a:bodyPr lIns="90000" rIns="90000" tIns="45000" bIns="45000">
+            <a:noAutofit/>
+          </a:bodyPr>
+          <a:p>
+            <a:r>
+              <a:rPr b="0" lang="en-IN" sz="1800" spc="-1" strike="noStrike">
+                <a:latin typeface="Arial"/>
+              </a:rPr>
+              <a:t>Hit Pattern in Cross Layer</a:t>
+            </a:r>
+            <a:endParaRPr b="0" lang="en-IN" sz="1800" spc="-1" strike="noStrike">
+              <a:latin typeface="Arial"/>
+            </a:endParaRPr>
+          </a:p>
+        </p:txBody>
+      </p:sp>
+      <p:sp>
+        <p:nvSpPr>
+          <p:cNvPr id="211" name="TextShape 4"/>
+          <p:cNvSpPr txBox="1"/>
+          <p:nvPr/>
+        </p:nvSpPr>
+        <p:spPr>
+          <a:xfrm>
+            <a:off x="864000" y="828000"/>
+            <a:ext cx="8352000" cy="373680"/>
+          </a:xfrm>
+          <a:prstGeom prst="rect">
+            <a:avLst/>
+          </a:prstGeom>
+          <a:noFill/>
+          <a:ln>
+            <a:noFill/>
+          </a:ln>
+        </p:spPr>
+        <p:txBody>
+          <a:bodyPr lIns="90000" rIns="90000" tIns="45000" bIns="45000">
+            <a:noAutofit/>
+          </a:bodyPr>
+          <a:p>
+            <a:r>
+              <a:rPr b="0" lang="en-IN" sz="2000" spc="-1" strike="noStrike">
+                <a:latin typeface="Arial"/>
+                <a:ea typeface="Noto Sans CJK SC"/>
+              </a:rPr>
+              <a:t>                    </a:t>
+            </a:r>
+            <a:r>
+              <a:rPr b="0" lang="en-IN" sz="2000" spc="-1" strike="noStrike">
+                <a:latin typeface="Arial"/>
+                <a:ea typeface="Noto Sans CJK SC"/>
+              </a:rPr>
+              <a:t>Reconstructed Hit Points using </a:t>
+            </a:r>
+            <a:r>
+              <a:rPr b="0" lang="en-IN" sz="2000" spc="-1" strike="noStrike">
+                <a:latin typeface="Arial"/>
+              </a:rPr>
+              <a:t>experimental</a:t>
+            </a:r>
+            <a:r>
+              <a:rPr b="0" lang="en-IN" sz="2000" spc="-1" strike="noStrike">
+                <a:latin typeface="Arial"/>
+              </a:rPr>
+              <a:t> data</a:t>
+            </a:r>
+            <a:endParaRPr b="0" lang="en-IN" sz="2000" spc="-1" strike="noStrike">
+              <a:latin typeface="Arial"/>
+            </a:endParaRPr>
+          </a:p>
+        </p:txBody>
+      </p:sp>
+      <p:pic>
+        <p:nvPicPr>
+          <p:cNvPr id="212" name="" descr=""/>
+          <p:cNvPicPr/>
+          <p:nvPr/>
+        </p:nvPicPr>
+        <p:blipFill>
+          <a:blip r:embed="rId1"/>
+          <a:stretch/>
+        </p:blipFill>
+        <p:spPr>
+          <a:xfrm>
+            <a:off x="2160000" y="1296000"/>
+            <a:ext cx="5181480" cy="3533400"/>
+          </a:xfrm>
+          <a:prstGeom prst="rect">
+            <a:avLst/>
+          </a:prstGeom>
+          <a:ln>
+            <a:noFill/>
+          </a:ln>
+        </p:spPr>
+      </p:pic>
+    </p:spTree>
+  </p:cSld>
+  <mc:AlternateContent>
+    <mc:Choice Requires="p14">
+      <p:transition spd="slow" p14:dur="2000"/>
+    </mc:Choice>
+    <mc:Fallback>
+      <p:transition spd="slow"/>
+    </mc:Fallback>
+  </mc:AlternateContent>
+</p:sld>
+</file>
+
+<file path=ppt/slides/slide15.xml><?xml version="1.0" encoding="utf-8"?>
+<p:sld xmlns:a="http://schemas.openxmlformats.org/drawingml/2006/main" xmlns:p="http://schemas.openxmlformats.org/presentationml/2006/main" xmlns:r="http://schemas.openxmlformats.org/officeDocument/2006/relationships" xmlns:p14="http://schemas.microsoft.com/office/powerpoint/2010/main" xmlns:p15="http://schemas.microsoft.com/office/powerpoint/2012/main" xmlns:mc="http://schemas.openxmlformats.org/markup-compatibility/2006">
+  <p:cSld>
+    <p:spTree>
+      <p:nvGrpSpPr>
+        <p:cNvPr id="1" name=""/>
+        <p:cNvGrpSpPr/>
+        <p:nvPr/>
+      </p:nvGrpSpPr>
+      <p:grpSpPr>
+        <a:xfrm>
+          <a:off x="0" y="0"/>
+          <a:ext cx="0" cy="0"/>
+          <a:chOff x="0" y="0"/>
+          <a:chExt cx="0" cy="0"/>
+        </a:xfrm>
+      </p:grpSpPr>
+      <p:sp>
+        <p:nvSpPr>
+          <p:cNvPr id="213" name="CustomShape 1"/>
+          <p:cNvSpPr/>
+          <p:nvPr/>
+        </p:nvSpPr>
+        <p:spPr>
+          <a:xfrm>
+            <a:off x="504000" y="226080"/>
+            <a:ext cx="9071280" cy="946080"/>
+          </a:xfrm>
+          <a:prstGeom prst="rect">
+            <a:avLst/>
+          </a:prstGeom>
+          <a:noFill/>
+          <a:ln>
+            <a:noFill/>
+          </a:ln>
+        </p:spPr>
+        <p:style>
+          <a:lnRef idx="0"/>
+          <a:fillRef idx="0"/>
+          <a:effectRef idx="0"/>
+          <a:fontRef idx="minor"/>
+        </p:style>
+      </p:sp>
+      <p:sp>
+        <p:nvSpPr>
+          <p:cNvPr id="214" name="CustomShape 2"/>
+          <p:cNvSpPr/>
+          <p:nvPr/>
+        </p:nvSpPr>
+        <p:spPr>
+          <a:xfrm>
+            <a:off x="504000" y="1326600"/>
+            <a:ext cx="9071280" cy="3287880"/>
+          </a:xfrm>
+          <a:prstGeom prst="rect">
+            <a:avLst/>
+          </a:prstGeom>
+          <a:noFill/>
+          <a:ln>
+            <a:noFill/>
+          </a:ln>
+        </p:spPr>
+        <p:style>
+          <a:lnRef idx="0"/>
+          <a:fillRef idx="0"/>
+          <a:effectRef idx="0"/>
+          <a:fontRef idx="minor"/>
+        </p:style>
+      </p:sp>
+      <p:sp>
+        <p:nvSpPr>
+          <p:cNvPr id="215" name="TextShape 3"/>
           <p:cNvSpPr txBox="1"/>
           <p:nvPr/>
         </p:nvSpPr>
@@ -4390,7 +4950,7 @@
       </p:sp>
       <p:sp>
         <p:nvSpPr>
-          <p:cNvPr id="194" name="CustomShape 4"/>
+          <p:cNvPr id="216" name="CustomShape 4"/>
           <p:cNvSpPr/>
           <p:nvPr/>
         </p:nvSpPr>
@@ -6256,7 +6816,43 @@
               <a:rPr b="0" lang="en-IN" sz="1800" spc="-1" strike="noStrike">
                 <a:latin typeface="Arial"/>
               </a:rPr>
-              <a:t>Bottom Layers</a:t>
+              <a:t>B</a:t>
+            </a:r>
+            <a:r>
+              <a:rPr b="0" lang="en-IN" sz="1800" spc="-1" strike="noStrike">
+                <a:latin typeface="Arial"/>
+              </a:rPr>
+              <a:t>ot</a:t>
+            </a:r>
+            <a:r>
+              <a:rPr b="0" lang="en-IN" sz="1800" spc="-1" strike="noStrike">
+                <a:latin typeface="Arial"/>
+              </a:rPr>
+              <a:t>to</a:t>
+            </a:r>
+            <a:r>
+              <a:rPr b="0" lang="en-IN" sz="1800" spc="-1" strike="noStrike">
+                <a:latin typeface="Arial"/>
+              </a:rPr>
+              <a:t>m </a:t>
+            </a:r>
+            <a:r>
+              <a:rPr b="0" lang="en-IN" sz="1800" spc="-1" strike="noStrike">
+                <a:latin typeface="Arial"/>
+              </a:rPr>
+              <a:t>La</a:t>
+            </a:r>
+            <a:r>
+              <a:rPr b="0" lang="en-IN" sz="1800" spc="-1" strike="noStrike">
+                <a:latin typeface="Arial"/>
+              </a:rPr>
+              <a:t>ye</a:t>
+            </a:r>
+            <a:r>
+              <a:rPr b="0" lang="en-IN" sz="1800" spc="-1" strike="noStrike">
+                <a:latin typeface="Arial"/>
+              </a:rPr>
+              <a:t>rs</a:t>
             </a:r>
             <a:endParaRPr b="0" lang="en-IN" sz="1800" spc="-1" strike="noStrike">
               <a:latin typeface="Arial"/>
@@ -6822,79 +7418,7 @@
               <a:rPr b="0" lang="en-IN" sz="1800" spc="-1" strike="noStrike">
                 <a:latin typeface="Arial"/>
               </a:rPr>
-              <a:t>Hi</a:t>
-            </a:r>
-            <a:r>
-              <a:rPr b="0" lang="en-IN" sz="1800" spc="-1" strike="noStrike">
-                <a:latin typeface="Arial"/>
-              </a:rPr>
-              <a:t>t </a:t>
-            </a:r>
-            <a:r>
-              <a:rPr b="0" lang="en-IN" sz="1800" spc="-1" strike="noStrike">
-                <a:latin typeface="Arial"/>
-              </a:rPr>
-              <a:t>P</a:t>
-            </a:r>
-            <a:r>
-              <a:rPr b="0" lang="en-IN" sz="1800" spc="-1" strike="noStrike">
-                <a:latin typeface="Arial"/>
-              </a:rPr>
-              <a:t>at</a:t>
-            </a:r>
-            <a:r>
-              <a:rPr b="0" lang="en-IN" sz="1800" spc="-1" strike="noStrike">
-                <a:latin typeface="Arial"/>
-              </a:rPr>
-              <a:t>te</a:t>
-            </a:r>
-            <a:r>
-              <a:rPr b="0" lang="en-IN" sz="1800" spc="-1" strike="noStrike">
-                <a:latin typeface="Arial"/>
-              </a:rPr>
-              <a:t>rn </a:t>
-            </a:r>
-            <a:r>
-              <a:rPr b="0" lang="en-IN" sz="1800" spc="-1" strike="noStrike">
-                <a:latin typeface="Arial"/>
-              </a:rPr>
-              <a:t>in </a:t>
-            </a:r>
-            <a:r>
-              <a:rPr b="0" lang="en-IN" sz="1800" spc="-1" strike="noStrike">
-                <a:latin typeface="Arial"/>
-              </a:rPr>
-              <a:t>Cr</a:t>
-            </a:r>
-            <a:r>
-              <a:rPr b="0" lang="en-IN" sz="1800" spc="-1" strike="noStrike">
-                <a:latin typeface="Arial"/>
-              </a:rPr>
-              <a:t>os</a:t>
-            </a:r>
-            <a:r>
-              <a:rPr b="0" lang="en-IN" sz="1800" spc="-1" strike="noStrike">
-                <a:latin typeface="Arial"/>
-              </a:rPr>
-              <a:t>s </a:t>
-            </a:r>
-            <a:r>
-              <a:rPr b="0" lang="en-IN" sz="1800" spc="-1" strike="noStrike">
-                <a:latin typeface="Arial"/>
-              </a:rPr>
-              <a:t>La</a:t>
-            </a:r>
-            <a:r>
-              <a:rPr b="0" lang="en-IN" sz="1800" spc="-1" strike="noStrike">
-                <a:latin typeface="Arial"/>
-              </a:rPr>
-              <a:t>ye</a:t>
-            </a:r>
-            <a:r>
-              <a:rPr b="0" lang="en-IN" sz="1800" spc="-1" strike="noStrike">
-                <a:latin typeface="Arial"/>
-              </a:rPr>
-              <a:t>r</a:t>
+              <a:t>Hit Pattern in Cross Layer</a:t>
             </a:r>
             <a:endParaRPr b="0" lang="en-IN" sz="1800" spc="-1" strike="noStrike">
               <a:latin typeface="Arial"/>
@@ -6930,67 +7454,7 @@
               <a:rPr b="0" lang="en-IN" sz="1800" spc="-1" strike="noStrike">
                 <a:latin typeface="Arial"/>
               </a:rPr>
-              <a:t>Hi</a:t>
-            </a:r>
-            <a:r>
-              <a:rPr b="0" lang="en-IN" sz="1800" spc="-1" strike="noStrike">
-                <a:latin typeface="Arial"/>
-              </a:rPr>
-              <a:t>st</a:t>
-            </a:r>
-            <a:r>
-              <a:rPr b="0" lang="en-IN" sz="1800" spc="-1" strike="noStrike">
-                <a:latin typeface="Arial"/>
-              </a:rPr>
-              <a:t>og</a:t>
-            </a:r>
-            <a:r>
-              <a:rPr b="0" lang="en-IN" sz="1800" spc="-1" strike="noStrike">
-                <a:latin typeface="Arial"/>
-              </a:rPr>
-              <a:t>ra</a:t>
-            </a:r>
-            <a:r>
-              <a:rPr b="0" lang="en-IN" sz="1800" spc="-1" strike="noStrike">
-                <a:latin typeface="Arial"/>
-              </a:rPr>
-              <a:t>m </a:t>
-            </a:r>
-            <a:r>
-              <a:rPr b="0" lang="en-IN" sz="1800" spc="-1" strike="noStrike">
-                <a:latin typeface="Arial"/>
-              </a:rPr>
-              <a:t>of </a:t>
-            </a:r>
-            <a:r>
-              <a:rPr b="0" lang="en-IN" sz="1800" spc="-1" strike="noStrike">
-                <a:latin typeface="Arial"/>
-              </a:rPr>
-              <a:t>R</a:t>
-            </a:r>
-            <a:r>
-              <a:rPr b="0" lang="en-IN" sz="1800" spc="-1" strike="noStrike">
-                <a:latin typeface="Arial"/>
-              </a:rPr>
-              <a:t>es</a:t>
-            </a:r>
-            <a:r>
-              <a:rPr b="0" lang="en-IN" sz="1800" spc="-1" strike="noStrike">
-                <a:latin typeface="Arial"/>
-              </a:rPr>
-              <a:t>id</a:t>
-            </a:r>
-            <a:r>
-              <a:rPr b="0" lang="en-IN" sz="1800" spc="-1" strike="noStrike">
-                <a:latin typeface="Arial"/>
-              </a:rPr>
-              <a:t>ua</a:t>
-            </a:r>
-            <a:r>
-              <a:rPr b="0" lang="en-IN" sz="1800" spc="-1" strike="noStrike">
-                <a:latin typeface="Arial"/>
-              </a:rPr>
-              <a:t>ls</a:t>
+              <a:t>Histogram of Residuals</a:t>
             </a:r>
             <a:endParaRPr b="0" lang="en-IN" sz="1800" spc="-1" strike="noStrike">
               <a:latin typeface="Arial"/>
@@ -7032,13 +7496,7 @@
               <a:rPr b="0" lang="en-IN" sz="2000" spc="-1" strike="noStrike">
                 <a:latin typeface="Arial"/>
               </a:rPr>
-              <a:t>Reconstructed Hit Points and Residual Plot using simulated </a:t>
-            </a:r>
-            <a:r>
-              <a:rPr b="0" lang="en-IN" sz="2000" spc="-1" strike="noStrike">
-                <a:latin typeface="Arial"/>
-              </a:rPr>
-              <a:t>data</a:t>
+              <a:t>Reconstructed Hit Points and Residual Plot using simulated data</a:t>
             </a:r>
             <a:endParaRPr b="0" lang="en-IN" sz="2000" spc="-1" strike="noStrike">
               <a:latin typeface="Arial"/>
@@ -7197,7 +7655,85 @@
               <a:rPr b="0" lang="en-IN" sz="1800" spc="-1" strike="noStrike">
                 <a:latin typeface="Arial"/>
               </a:rPr>
-              <a:t>Hit Pattern in Oblong Layer</a:t>
+              <a:t>Hi</a:t>
+            </a:r>
+            <a:r>
+              <a:rPr b="0" lang="en-IN" sz="1800" spc="-1" strike="noStrike">
+                <a:latin typeface="Arial"/>
+              </a:rPr>
+              <a:t>t </a:t>
+            </a:r>
+            <a:r>
+              <a:rPr b="0" lang="en-IN" sz="1800" spc="-1" strike="noStrike">
+                <a:latin typeface="Arial"/>
+              </a:rPr>
+              <a:t>P</a:t>
+            </a:r>
+            <a:r>
+              <a:rPr b="0" lang="en-IN" sz="1800" spc="-1" strike="noStrike">
+                <a:latin typeface="Arial"/>
+              </a:rPr>
+              <a:t>at</a:t>
+            </a:r>
+            <a:r>
+              <a:rPr b="0" lang="en-IN" sz="1800" spc="-1" strike="noStrike">
+                <a:latin typeface="Arial"/>
+              </a:rPr>
+              <a:t>te</a:t>
+            </a:r>
+            <a:r>
+              <a:rPr b="0" lang="en-IN" sz="1800" spc="-1" strike="noStrike">
+                <a:latin typeface="Arial"/>
+              </a:rPr>
+              <a:t>rn </a:t>
+            </a:r>
+            <a:r>
+              <a:rPr b="0" lang="en-IN" sz="1800" spc="-1" strike="noStrike">
+                <a:latin typeface="Arial"/>
+              </a:rPr>
+              <a:t>in </a:t>
+            </a:r>
+            <a:r>
+              <a:rPr b="0" lang="en-IN" sz="1800" spc="-1" strike="noStrike">
+                <a:latin typeface="Arial"/>
+              </a:rPr>
+              <a:t>O</a:t>
+            </a:r>
+            <a:r>
+              <a:rPr b="0" lang="en-IN" sz="1800" spc="-1" strike="noStrike">
+                <a:latin typeface="Arial"/>
+              </a:rPr>
+              <a:t>bl</a:t>
+            </a:r>
+            <a:r>
+              <a:rPr b="0" lang="en-IN" sz="1800" spc="-1" strike="noStrike">
+                <a:latin typeface="Arial"/>
+              </a:rPr>
+              <a:t>on</a:t>
+            </a:r>
+            <a:r>
+              <a:rPr b="0" lang="en-IN" sz="1800" spc="-1" strike="noStrike">
+                <a:latin typeface="Arial"/>
+              </a:rPr>
+              <a:t>g </a:t>
+            </a:r>
+            <a:r>
+              <a:rPr b="0" lang="en-IN" sz="1800" spc="-1" strike="noStrike">
+                <a:latin typeface="Arial"/>
+              </a:rPr>
+              <a:t>La</a:t>
+            </a:r>
+            <a:r>
+              <a:rPr b="0" lang="en-IN" sz="1800" spc="-1" strike="noStrike">
+                <a:latin typeface="Arial"/>
+              </a:rPr>
+              <a:t>ye</a:t>
+            </a:r>
+            <a:r>
+              <a:rPr b="0" lang="en-IN" sz="1800" spc="-1" strike="noStrike">
+                <a:latin typeface="Arial"/>
+              </a:rPr>
+              <a:t>r</a:t>
             </a:r>
             <a:endParaRPr b="0" lang="en-IN" sz="1800" spc="-1" strike="noStrike">
               <a:latin typeface="Arial"/>
@@ -7233,67 +7769,7 @@
               <a:rPr b="0" lang="en-IN" sz="1800" spc="-1" strike="noStrike">
                 <a:latin typeface="Arial"/>
               </a:rPr>
-              <a:t>Hi</a:t>
-            </a:r>
-            <a:r>
-              <a:rPr b="0" lang="en-IN" sz="1800" spc="-1" strike="noStrike">
-                <a:latin typeface="Arial"/>
-              </a:rPr>
-              <a:t>st</a:t>
-            </a:r>
-            <a:r>
-              <a:rPr b="0" lang="en-IN" sz="1800" spc="-1" strike="noStrike">
-                <a:latin typeface="Arial"/>
-              </a:rPr>
-              <a:t>og</a:t>
-            </a:r>
-            <a:r>
-              <a:rPr b="0" lang="en-IN" sz="1800" spc="-1" strike="noStrike">
-                <a:latin typeface="Arial"/>
-              </a:rPr>
-              <a:t>ra</a:t>
-            </a:r>
-            <a:r>
-              <a:rPr b="0" lang="en-IN" sz="1800" spc="-1" strike="noStrike">
-                <a:latin typeface="Arial"/>
-              </a:rPr>
-              <a:t>m </a:t>
-            </a:r>
-            <a:r>
-              <a:rPr b="0" lang="en-IN" sz="1800" spc="-1" strike="noStrike">
-                <a:latin typeface="Arial"/>
-              </a:rPr>
-              <a:t>of </a:t>
-            </a:r>
-            <a:r>
-              <a:rPr b="0" lang="en-IN" sz="1800" spc="-1" strike="noStrike">
-                <a:latin typeface="Arial"/>
-              </a:rPr>
-              <a:t>R</a:t>
-            </a:r>
-            <a:r>
-              <a:rPr b="0" lang="en-IN" sz="1800" spc="-1" strike="noStrike">
-                <a:latin typeface="Arial"/>
-              </a:rPr>
-              <a:t>es</a:t>
-            </a:r>
-            <a:r>
-              <a:rPr b="0" lang="en-IN" sz="1800" spc="-1" strike="noStrike">
-                <a:latin typeface="Arial"/>
-              </a:rPr>
-              <a:t>id</a:t>
-            </a:r>
-            <a:r>
-              <a:rPr b="0" lang="en-IN" sz="1800" spc="-1" strike="noStrike">
-                <a:latin typeface="Arial"/>
-              </a:rPr>
-              <a:t>ua</a:t>
-            </a:r>
-            <a:r>
-              <a:rPr b="0" lang="en-IN" sz="1800" spc="-1" strike="noStrike">
-                <a:latin typeface="Arial"/>
-              </a:rPr>
-              <a:t>ls</a:t>
+              <a:t>Histogram of Residuals</a:t>
             </a:r>
             <a:endParaRPr b="0" lang="en-IN" sz="1800" spc="-1" strike="noStrike">
               <a:latin typeface="Arial"/>
@@ -7329,259 +7805,13 @@
               <a:rPr b="0" lang="en-IN" sz="2000" spc="-1" strike="noStrike">
                 <a:latin typeface="Arial"/>
               </a:rPr>
-              <a:t>    </a:t>
+              <a:t>          </a:t>
             </a:r>
             <a:r>
               <a:rPr b="0" lang="en-IN" sz="2000" spc="-1" strike="noStrike">
                 <a:latin typeface="Arial"/>
               </a:rPr>
-              <a:t>    </a:t>
-            </a:r>
-            <a:r>
-              <a:rPr b="0" lang="en-IN" sz="2000" spc="-1" strike="noStrike">
-                <a:latin typeface="Arial"/>
-              </a:rPr>
-              <a:t>  </a:t>
-            </a:r>
-            <a:r>
-              <a:rPr b="0" lang="en-IN" sz="2000" spc="-1" strike="noStrike">
-                <a:latin typeface="Arial"/>
-              </a:rPr>
-              <a:t>R</a:t>
-            </a:r>
-            <a:r>
-              <a:rPr b="0" lang="en-IN" sz="2000" spc="-1" strike="noStrike">
-                <a:latin typeface="Arial"/>
-              </a:rPr>
-              <a:t>e</a:t>
-            </a:r>
-            <a:r>
-              <a:rPr b="0" lang="en-IN" sz="2000" spc="-1" strike="noStrike">
-                <a:latin typeface="Arial"/>
-              </a:rPr>
-              <a:t>c</a:t>
-            </a:r>
-            <a:r>
-              <a:rPr b="0" lang="en-IN" sz="2000" spc="-1" strike="noStrike">
-                <a:latin typeface="Arial"/>
-              </a:rPr>
-              <a:t>o</a:t>
-            </a:r>
-            <a:r>
-              <a:rPr b="0" lang="en-IN" sz="2000" spc="-1" strike="noStrike">
-                <a:latin typeface="Arial"/>
-              </a:rPr>
-              <a:t>n</a:t>
-            </a:r>
-            <a:r>
-              <a:rPr b="0" lang="en-IN" sz="2000" spc="-1" strike="noStrike">
-                <a:latin typeface="Arial"/>
-              </a:rPr>
-              <a:t>st</a:t>
-            </a:r>
-            <a:r>
-              <a:rPr b="0" lang="en-IN" sz="2000" spc="-1" strike="noStrike">
-                <a:latin typeface="Arial"/>
-              </a:rPr>
-              <a:t>ru</a:t>
-            </a:r>
-            <a:r>
-              <a:rPr b="0" lang="en-IN" sz="2000" spc="-1" strike="noStrike">
-                <a:latin typeface="Arial"/>
-              </a:rPr>
-              <a:t>ct</a:t>
-            </a:r>
-            <a:r>
-              <a:rPr b="0" lang="en-IN" sz="2000" spc="-1" strike="noStrike">
-                <a:latin typeface="Arial"/>
-              </a:rPr>
-              <a:t>e</a:t>
-            </a:r>
-            <a:r>
-              <a:rPr b="0" lang="en-IN" sz="2000" spc="-1" strike="noStrike">
-                <a:latin typeface="Arial"/>
-              </a:rPr>
-              <a:t>d </a:t>
-            </a:r>
-            <a:r>
-              <a:rPr b="0" lang="en-IN" sz="2000" spc="-1" strike="noStrike">
-                <a:latin typeface="Arial"/>
-              </a:rPr>
-              <a:t>Hi</a:t>
-            </a:r>
-            <a:r>
-              <a:rPr b="0" lang="en-IN" sz="2000" spc="-1" strike="noStrike">
-                <a:latin typeface="Arial"/>
-              </a:rPr>
-              <a:t>t </a:t>
-            </a:r>
-            <a:r>
-              <a:rPr b="0" lang="en-IN" sz="2000" spc="-1" strike="noStrike">
-                <a:latin typeface="Arial"/>
-              </a:rPr>
-              <a:t>P</a:t>
-            </a:r>
-            <a:r>
-              <a:rPr b="0" lang="en-IN" sz="2000" spc="-1" strike="noStrike">
-                <a:latin typeface="Arial"/>
-              </a:rPr>
-              <a:t>oi</a:t>
-            </a:r>
-            <a:r>
-              <a:rPr b="0" lang="en-IN" sz="2000" spc="-1" strike="noStrike">
-                <a:latin typeface="Arial"/>
-              </a:rPr>
-              <a:t>nt</a:t>
-            </a:r>
-            <a:r>
-              <a:rPr b="0" lang="en-IN" sz="2000" spc="-1" strike="noStrike">
-                <a:latin typeface="Arial"/>
-              </a:rPr>
-              <a:t>s </a:t>
-            </a:r>
-            <a:r>
-              <a:rPr b="0" lang="en-IN" sz="2000" spc="-1" strike="noStrike">
-                <a:latin typeface="Arial"/>
-              </a:rPr>
-              <a:t>a</a:t>
-            </a:r>
-            <a:r>
-              <a:rPr b="0" lang="en-IN" sz="2000" spc="-1" strike="noStrike">
-                <a:latin typeface="Arial"/>
-              </a:rPr>
-              <a:t>n</a:t>
-            </a:r>
-            <a:r>
-              <a:rPr b="0" lang="en-IN" sz="2000" spc="-1" strike="noStrike">
-                <a:latin typeface="Arial"/>
-              </a:rPr>
-              <a:t>d </a:t>
-            </a:r>
-            <a:r>
-              <a:rPr b="0" lang="en-IN" sz="2000" spc="-1" strike="noStrike">
-                <a:latin typeface="Arial"/>
-              </a:rPr>
-              <a:t>R</a:t>
-            </a:r>
-            <a:r>
-              <a:rPr b="0" lang="en-IN" sz="2000" spc="-1" strike="noStrike">
-                <a:latin typeface="Arial"/>
-              </a:rPr>
-              <a:t>e</a:t>
-            </a:r>
-            <a:r>
-              <a:rPr b="0" lang="en-IN" sz="2000" spc="-1" strike="noStrike">
-                <a:latin typeface="Arial"/>
-              </a:rPr>
-              <a:t>si</a:t>
-            </a:r>
-            <a:r>
-              <a:rPr b="0" lang="en-IN" sz="2000" spc="-1" strike="noStrike">
-                <a:latin typeface="Arial"/>
-              </a:rPr>
-              <a:t>d</a:t>
-            </a:r>
-            <a:r>
-              <a:rPr b="0" lang="en-IN" sz="2000" spc="-1" strike="noStrike">
-                <a:latin typeface="Arial"/>
-              </a:rPr>
-              <a:t>u</a:t>
-            </a:r>
-            <a:r>
-              <a:rPr b="0" lang="en-IN" sz="2000" spc="-1" strike="noStrike">
-                <a:latin typeface="Arial"/>
-              </a:rPr>
-              <a:t>al </a:t>
-            </a:r>
-            <a:r>
-              <a:rPr b="0" lang="en-IN" sz="2000" spc="-1" strike="noStrike">
-                <a:latin typeface="Arial"/>
-              </a:rPr>
-              <a:t>Pl</a:t>
-            </a:r>
-            <a:r>
-              <a:rPr b="0" lang="en-IN" sz="2000" spc="-1" strike="noStrike">
-                <a:latin typeface="Arial"/>
-              </a:rPr>
-              <a:t>ot </a:t>
-            </a:r>
-            <a:r>
-              <a:rPr b="0" lang="en-IN" sz="2000" spc="-1" strike="noStrike">
-                <a:latin typeface="Arial"/>
-              </a:rPr>
-              <a:t>u</a:t>
-            </a:r>
-            <a:r>
-              <a:rPr b="0" lang="en-IN" sz="2000" spc="-1" strike="noStrike">
-                <a:latin typeface="Arial"/>
-              </a:rPr>
-              <a:t>si</a:t>
-            </a:r>
-            <a:r>
-              <a:rPr b="0" lang="en-IN" sz="2000" spc="-1" strike="noStrike">
-                <a:latin typeface="Arial"/>
-              </a:rPr>
-              <a:t>n</a:t>
-            </a:r>
-            <a:r>
-              <a:rPr b="0" lang="en-IN" sz="2000" spc="-1" strike="noStrike">
-                <a:latin typeface="Arial"/>
-              </a:rPr>
-              <a:t>g </a:t>
-            </a:r>
-            <a:r>
-              <a:rPr b="0" lang="en-IN" sz="2000" spc="-1" strike="noStrike">
-                <a:latin typeface="Arial"/>
-              </a:rPr>
-              <a:t>si</a:t>
-            </a:r>
-            <a:r>
-              <a:rPr b="0" lang="en-IN" sz="2000" spc="-1" strike="noStrike">
-                <a:latin typeface="Arial"/>
-              </a:rPr>
-              <a:t>m</a:t>
-            </a:r>
-            <a:r>
-              <a:rPr b="0" lang="en-IN" sz="2000" spc="-1" strike="noStrike">
-                <a:latin typeface="Arial"/>
-              </a:rPr>
-              <a:t>ul</a:t>
-            </a:r>
-            <a:r>
-              <a:rPr b="0" lang="en-IN" sz="2000" spc="-1" strike="noStrike">
-                <a:latin typeface="Arial"/>
-              </a:rPr>
-              <a:t>at</a:t>
-            </a:r>
-            <a:r>
-              <a:rPr b="0" lang="en-IN" sz="2000" spc="-1" strike="noStrike">
-                <a:latin typeface="Arial"/>
-              </a:rPr>
-              <a:t>e</a:t>
-            </a:r>
-            <a:r>
-              <a:rPr b="0" lang="en-IN" sz="2000" spc="-1" strike="noStrike">
-                <a:latin typeface="Arial"/>
-              </a:rPr>
-              <a:t>d </a:t>
-            </a:r>
-            <a:r>
-              <a:rPr b="0" lang="en-IN" sz="2000" spc="-1" strike="noStrike">
-                <a:latin typeface="Arial"/>
-              </a:rPr>
-              <a:t>d</a:t>
-            </a:r>
-            <a:r>
-              <a:rPr b="0" lang="en-IN" sz="2000" spc="-1" strike="noStrike">
-                <a:latin typeface="Arial"/>
-              </a:rPr>
-              <a:t>at</a:t>
-            </a:r>
-            <a:r>
-              <a:rPr b="0" lang="en-IN" sz="2000" spc="-1" strike="noStrike">
-                <a:latin typeface="Arial"/>
-              </a:rPr>
-              <a:t>a</a:t>
+              <a:t>Reconstructed Hit Points and Residual Plot using simulated data</a:t>
             </a:r>
             <a:endParaRPr b="0" lang="en-IN" sz="2000" spc="-1" strike="noStrike">
               <a:latin typeface="Arial"/>
@@ -8166,7 +8396,85 @@
               <a:rPr b="0" lang="en-IN" sz="1400" spc="-1" strike="noStrike">
                 <a:latin typeface="Arial"/>
               </a:rPr>
-              <a:t>Histogram of Residuals using layer</a:t>
+              <a:t>Hi</a:t>
+            </a:r>
+            <a:r>
+              <a:rPr b="0" lang="en-IN" sz="1400" spc="-1" strike="noStrike">
+                <a:latin typeface="Arial"/>
+              </a:rPr>
+              <a:t>sto</a:t>
+            </a:r>
+            <a:r>
+              <a:rPr b="0" lang="en-IN" sz="1400" spc="-1" strike="noStrike">
+                <a:latin typeface="Arial"/>
+              </a:rPr>
+              <a:t>gr</a:t>
+            </a:r>
+            <a:r>
+              <a:rPr b="0" lang="en-IN" sz="1400" spc="-1" strike="noStrike">
+                <a:latin typeface="Arial"/>
+              </a:rPr>
+              <a:t>a</a:t>
+            </a:r>
+            <a:r>
+              <a:rPr b="0" lang="en-IN" sz="1400" spc="-1" strike="noStrike">
+                <a:latin typeface="Arial"/>
+              </a:rPr>
+              <a:t>m </a:t>
+            </a:r>
+            <a:r>
+              <a:rPr b="0" lang="en-IN" sz="1400" spc="-1" strike="noStrike">
+                <a:latin typeface="Arial"/>
+              </a:rPr>
+              <a:t>of </a:t>
+            </a:r>
+            <a:r>
+              <a:rPr b="0" lang="en-IN" sz="1400" spc="-1" strike="noStrike">
+                <a:latin typeface="Arial"/>
+              </a:rPr>
+              <a:t>Re</a:t>
+            </a:r>
+            <a:r>
+              <a:rPr b="0" lang="en-IN" sz="1400" spc="-1" strike="noStrike">
+                <a:latin typeface="Arial"/>
+              </a:rPr>
+              <a:t>sid</a:t>
+            </a:r>
+            <a:r>
+              <a:rPr b="0" lang="en-IN" sz="1400" spc="-1" strike="noStrike">
+                <a:latin typeface="Arial"/>
+              </a:rPr>
+              <a:t>ual</a:t>
+            </a:r>
+            <a:r>
+              <a:rPr b="0" lang="en-IN" sz="1400" spc="-1" strike="noStrike">
+                <a:latin typeface="Arial"/>
+              </a:rPr>
+              <a:t>s </a:t>
+            </a:r>
+            <a:r>
+              <a:rPr b="0" lang="en-IN" sz="1400" spc="-1" strike="noStrike">
+                <a:latin typeface="Arial"/>
+              </a:rPr>
+              <a:t>usi</a:t>
+            </a:r>
+            <a:r>
+              <a:rPr b="0" lang="en-IN" sz="1400" spc="-1" strike="noStrike">
+                <a:latin typeface="Arial"/>
+              </a:rPr>
+              <a:t>ng </a:t>
+            </a:r>
+            <a:r>
+              <a:rPr b="0" lang="en-IN" sz="1400" spc="-1" strike="noStrike">
+                <a:latin typeface="Arial"/>
+              </a:rPr>
+              <a:t>lay</a:t>
+            </a:r>
+            <a:r>
+              <a:rPr b="0" lang="en-IN" sz="1400" spc="-1" strike="noStrike">
+                <a:latin typeface="Arial"/>
+              </a:rPr>
+              <a:t>er</a:t>
             </a:r>
             <a:endParaRPr b="0" lang="en-IN" sz="1400" spc="-1" strike="noStrike">
               <a:latin typeface="Arial"/>
@@ -8177,13 +8485,43 @@
               <a:rPr b="0" lang="en-IN" sz="1400" spc="-1" strike="noStrike">
                 <a:latin typeface="Arial"/>
               </a:rPr>
-              <a:t>                      </a:t>
+              <a:t>      </a:t>
             </a:r>
             <a:r>
               <a:rPr b="0" lang="en-IN" sz="1400" spc="-1" strike="noStrike">
                 <a:latin typeface="Arial"/>
               </a:rPr>
-              <a:t>8 &amp; 3</a:t>
+              <a:t>      </a:t>
+            </a:r>
+            <a:r>
+              <a:rPr b="0" lang="en-IN" sz="1400" spc="-1" strike="noStrike">
+                <a:latin typeface="Arial"/>
+              </a:rPr>
+              <a:t>      </a:t>
+            </a:r>
+            <a:r>
+              <a:rPr b="0" lang="en-IN" sz="1400" spc="-1" strike="noStrike">
+                <a:latin typeface="Arial"/>
+              </a:rPr>
+              <a:t>    </a:t>
+            </a:r>
+            <a:r>
+              <a:rPr b="0" lang="en-IN" sz="1400" spc="-1" strike="noStrike">
+                <a:latin typeface="Arial"/>
+              </a:rPr>
+              <a:t>8 </a:t>
+            </a:r>
+            <a:r>
+              <a:rPr b="0" lang="en-IN" sz="1400" spc="-1" strike="noStrike">
+                <a:latin typeface="Arial"/>
+              </a:rPr>
+              <a:t>&amp; </a:t>
+            </a:r>
+            <a:r>
+              <a:rPr b="0" lang="en-IN" sz="1400" spc="-1" strike="noStrike">
+                <a:latin typeface="Arial"/>
+              </a:rPr>
+              <a:t>3</a:t>
             </a:r>
             <a:endParaRPr b="0" lang="en-IN" sz="1400" spc="-1" strike="noStrike">
               <a:latin typeface="Arial"/>
@@ -8322,85 +8660,7 @@
               <a:rPr b="0" lang="en-IN" sz="1800" spc="-1" strike="noStrike">
                 <a:latin typeface="Arial"/>
               </a:rPr>
-              <a:t>Hi</a:t>
-            </a:r>
-            <a:r>
-              <a:rPr b="0" lang="en-IN" sz="1800" spc="-1" strike="noStrike">
-                <a:latin typeface="Arial"/>
-              </a:rPr>
-              <a:t>t </a:t>
-            </a:r>
-            <a:r>
-              <a:rPr b="0" lang="en-IN" sz="1800" spc="-1" strike="noStrike">
-                <a:latin typeface="Arial"/>
-              </a:rPr>
-              <a:t>P</a:t>
-            </a:r>
-            <a:r>
-              <a:rPr b="0" lang="en-IN" sz="1800" spc="-1" strike="noStrike">
-                <a:latin typeface="Arial"/>
-              </a:rPr>
-              <a:t>at</a:t>
-            </a:r>
-            <a:r>
-              <a:rPr b="0" lang="en-IN" sz="1800" spc="-1" strike="noStrike">
-                <a:latin typeface="Arial"/>
-              </a:rPr>
-              <a:t>te</a:t>
-            </a:r>
-            <a:r>
-              <a:rPr b="0" lang="en-IN" sz="1800" spc="-1" strike="noStrike">
-                <a:latin typeface="Arial"/>
-              </a:rPr>
-              <a:t>rn </a:t>
-            </a:r>
-            <a:r>
-              <a:rPr b="0" lang="en-IN" sz="1800" spc="-1" strike="noStrike">
-                <a:latin typeface="Arial"/>
-              </a:rPr>
-              <a:t>in </a:t>
-            </a:r>
-            <a:r>
-              <a:rPr b="0" lang="en-IN" sz="1800" spc="-1" strike="noStrike">
-                <a:latin typeface="Arial"/>
-              </a:rPr>
-              <a:t>O</a:t>
-            </a:r>
-            <a:r>
-              <a:rPr b="0" lang="en-IN" sz="1800" spc="-1" strike="noStrike">
-                <a:latin typeface="Arial"/>
-              </a:rPr>
-              <a:t>bl</a:t>
-            </a:r>
-            <a:r>
-              <a:rPr b="0" lang="en-IN" sz="1800" spc="-1" strike="noStrike">
-                <a:latin typeface="Arial"/>
-              </a:rPr>
-              <a:t>on</a:t>
-            </a:r>
-            <a:r>
-              <a:rPr b="0" lang="en-IN" sz="1800" spc="-1" strike="noStrike">
-                <a:latin typeface="Arial"/>
-              </a:rPr>
-              <a:t>g </a:t>
-            </a:r>
-            <a:r>
-              <a:rPr b="0" lang="en-IN" sz="1800" spc="-1" strike="noStrike">
-                <a:latin typeface="Arial"/>
-              </a:rPr>
-              <a:t>La</a:t>
-            </a:r>
-            <a:r>
-              <a:rPr b="0" lang="en-IN" sz="1800" spc="-1" strike="noStrike">
-                <a:latin typeface="Arial"/>
-              </a:rPr>
-              <a:t>ye</a:t>
-            </a:r>
-            <a:r>
-              <a:rPr b="0" lang="en-IN" sz="1800" spc="-1" strike="noStrike">
-                <a:latin typeface="Arial"/>
-              </a:rPr>
-              <a:t>r</a:t>
+              <a:t>Hit Pattern in Oblong Layer</a:t>
             </a:r>
             <a:endParaRPr b="0" lang="en-IN" sz="1800" spc="-1" strike="noStrike">
               <a:latin typeface="Arial"/>
@@ -8503,171 +8763,98 @@
           <a:chExt cx="0" cy="0"/>
         </a:xfrm>
       </p:grpSpPr>
-      <p:sp>
-        <p:nvSpPr>
-          <p:cNvPr id="166" name="CustomShape 1"/>
-          <p:cNvSpPr/>
+      <p:pic>
+        <p:nvPicPr>
+          <p:cNvPr id="166" name="" descr=""/>
+          <p:cNvPicPr/>
           <p:nvPr/>
-        </p:nvSpPr>
-        <p:spPr>
-          <a:xfrm>
-            <a:off x="504000" y="226080"/>
-            <a:ext cx="9071280" cy="946080"/>
-          </a:xfrm>
-          <a:prstGeom prst="rect">
-            <a:avLst/>
-          </a:prstGeom>
-          <a:noFill/>
+        </p:nvPicPr>
+        <p:blipFill>
+          <a:blip r:embed="rId1"/>
+          <a:stretch/>
+        </p:blipFill>
+        <p:spPr>
+          <a:xfrm>
+            <a:off x="187200" y="156240"/>
+            <a:ext cx="2548800" cy="1823760"/>
+          </a:xfrm>
+          <a:prstGeom prst="rect">
+            <a:avLst/>
+          </a:prstGeom>
           <a:ln>
             <a:noFill/>
           </a:ln>
         </p:spPr>
-        <p:style>
-          <a:lnRef idx="0"/>
-          <a:fillRef idx="0"/>
-          <a:effectRef idx="0"/>
-          <a:fontRef idx="minor"/>
-        </p:style>
-      </p:sp>
-      <p:sp>
-        <p:nvSpPr>
-          <p:cNvPr id="167" name="CustomShape 2"/>
-          <p:cNvSpPr/>
+      </p:pic>
+      <p:pic>
+        <p:nvPicPr>
+          <p:cNvPr id="167" name="" descr=""/>
+          <p:cNvPicPr/>
           <p:nvPr/>
-        </p:nvSpPr>
-        <p:spPr>
-          <a:xfrm>
-            <a:off x="504000" y="-61920"/>
-            <a:ext cx="9071280" cy="946080"/>
-          </a:xfrm>
-          <a:prstGeom prst="rect">
-            <a:avLst/>
-          </a:prstGeom>
-          <a:noFill/>
+        </p:nvPicPr>
+        <p:blipFill>
+          <a:blip r:embed="rId2"/>
+          <a:stretch/>
+        </p:blipFill>
+        <p:spPr>
+          <a:xfrm>
+            <a:off x="2736360" y="75600"/>
+            <a:ext cx="2618640" cy="1904400"/>
+          </a:xfrm>
+          <a:prstGeom prst="rect">
+            <a:avLst/>
+          </a:prstGeom>
           <a:ln>
             <a:noFill/>
           </a:ln>
         </p:spPr>
-        <p:style>
-          <a:lnRef idx="0"/>
-          <a:fillRef idx="0"/>
-          <a:effectRef idx="0"/>
-          <a:fontRef idx="minor"/>
-        </p:style>
-        <p:txBody>
-          <a:bodyPr lIns="0" rIns="0" tIns="0" bIns="0" anchor="ctr">
-            <a:noAutofit/>
-          </a:bodyPr>
-          <a:p>
-            <a:pPr algn="ctr">
-              <a:lnSpc>
-                <a:spcPct val="100000"/>
-              </a:lnSpc>
-            </a:pPr>
-            <a:r>
-              <a:rPr b="0" lang="en-IN" sz="4400" spc="-1" strike="noStrike">
-                <a:latin typeface="Arial"/>
-              </a:rPr>
-              <a:t>Layer 8</a:t>
-            </a:r>
-            <a:endParaRPr b="0" lang="en-IN" sz="4400" spc="-1" strike="noStrike">
-              <a:latin typeface="Arial"/>
-            </a:endParaRPr>
-          </a:p>
-        </p:txBody>
-      </p:sp>
-      <p:sp>
-        <p:nvSpPr>
-          <p:cNvPr id="168" name="TextShape 3"/>
-          <p:cNvSpPr txBox="1"/>
+      </p:pic>
+      <p:pic>
+        <p:nvPicPr>
+          <p:cNvPr id="168" name="" descr=""/>
+          <p:cNvPicPr/>
           <p:nvPr/>
-        </p:nvSpPr>
-        <p:spPr>
-          <a:xfrm>
-            <a:off x="3384000" y="4968000"/>
-            <a:ext cx="3456000" cy="346320"/>
-          </a:xfrm>
-          <a:prstGeom prst="rect">
-            <a:avLst/>
-          </a:prstGeom>
-          <a:noFill/>
+        </p:nvPicPr>
+        <p:blipFill>
+          <a:blip r:embed="rId3"/>
+          <a:stretch/>
+        </p:blipFill>
+        <p:spPr>
+          <a:xfrm>
+            <a:off x="5400000" y="36000"/>
+            <a:ext cx="2664000" cy="1952640"/>
+          </a:xfrm>
+          <a:prstGeom prst="rect">
+            <a:avLst/>
+          </a:prstGeom>
           <a:ln>
             <a:noFill/>
           </a:ln>
         </p:spPr>
-        <p:txBody>
-          <a:bodyPr lIns="90000" rIns="90000" tIns="45000" bIns="45000">
-            <a:noAutofit/>
-          </a:bodyPr>
-          <a:p>
-            <a:r>
-              <a:rPr b="0" lang="en-IN" sz="1800" spc="-1" strike="noStrike">
-                <a:latin typeface="Arial"/>
-              </a:rPr>
-              <a:t>Hit Pattern in Cross Layer</a:t>
-            </a:r>
-            <a:endParaRPr b="0" lang="en-IN" sz="1800" spc="-1" strike="noStrike">
-              <a:latin typeface="Arial"/>
-            </a:endParaRPr>
-          </a:p>
-        </p:txBody>
-      </p:sp>
-      <p:sp>
-        <p:nvSpPr>
-          <p:cNvPr id="169" name="TextShape 4"/>
-          <p:cNvSpPr txBox="1"/>
+      </p:pic>
+      <p:pic>
+        <p:nvPicPr>
+          <p:cNvPr id="169" name="" descr=""/>
+          <p:cNvPicPr/>
           <p:nvPr/>
-        </p:nvSpPr>
-        <p:spPr>
-          <a:xfrm>
-            <a:off x="864000" y="828000"/>
-            <a:ext cx="8352000" cy="373680"/>
-          </a:xfrm>
-          <a:prstGeom prst="rect">
-            <a:avLst/>
-          </a:prstGeom>
-          <a:noFill/>
+        </p:nvPicPr>
+        <p:blipFill>
+          <a:blip r:embed="rId4"/>
+          <a:stretch/>
+        </p:blipFill>
+        <p:spPr>
+          <a:xfrm>
+            <a:off x="259200" y="1996920"/>
+            <a:ext cx="2476800" cy="1819080"/>
+          </a:xfrm>
+          <a:prstGeom prst="rect">
+            <a:avLst/>
+          </a:prstGeom>
           <a:ln>
             <a:noFill/>
           </a:ln>
         </p:spPr>
-        <p:txBody>
-          <a:bodyPr lIns="90000" rIns="90000" tIns="45000" bIns="45000">
-            <a:noAutofit/>
-          </a:bodyPr>
-          <a:p>
-            <a:r>
-              <a:rPr b="0" lang="en-IN" sz="2000" spc="-1" strike="noStrike">
-                <a:latin typeface="Arial"/>
-                <a:ea typeface="Noto Sans CJK SC"/>
-              </a:rPr>
-              <a:t>                    </a:t>
-            </a:r>
-            <a:r>
-              <a:rPr b="0" lang="en-IN" sz="2000" spc="-1" strike="noStrike">
-                <a:latin typeface="Arial"/>
-                <a:ea typeface="Noto Sans CJK SC"/>
-              </a:rPr>
-              <a:t>Reconstructed Hit Points using </a:t>
-            </a:r>
-            <a:r>
-              <a:rPr b="0" lang="en-IN" sz="2000" spc="-1" strike="noStrike">
-                <a:latin typeface="Arial"/>
-              </a:rPr>
-              <a:t>experimental</a:t>
-            </a:r>
-            <a:r>
-              <a:rPr b="0" lang="en-IN" sz="2000" spc="-1" strike="noStrike">
-                <a:latin typeface="Arial"/>
-              </a:rPr>
-              <a:t> data</a:t>
-            </a:r>
-            <a:endParaRPr b="0" lang="en-IN" sz="2000" spc="-1" strike="noStrike">
-              <a:latin typeface="Arial"/>
-            </a:endParaRPr>
-          </a:p>
-        </p:txBody>
-      </p:sp>
+      </p:pic>
       <p:pic>
         <p:nvPicPr>
           <p:cNvPr id="170" name="" descr=""/>
@@ -8675,13 +8862,128 @@
           <p:nvPr/>
         </p:nvPicPr>
         <p:blipFill>
-          <a:blip r:embed="rId1"/>
+          <a:blip r:embed="rId5"/>
           <a:stretch/>
         </p:blipFill>
         <p:spPr>
           <a:xfrm>
-            <a:off x="1944000" y="1311840"/>
-            <a:ext cx="5472000" cy="3728160"/>
+            <a:off x="2761560" y="1916640"/>
+            <a:ext cx="2737800" cy="1983600"/>
+          </a:xfrm>
+          <a:prstGeom prst="rect">
+            <a:avLst/>
+          </a:prstGeom>
+          <a:ln>
+            <a:noFill/>
+          </a:ln>
+        </p:spPr>
+      </p:pic>
+      <p:pic>
+        <p:nvPicPr>
+          <p:cNvPr id="171" name="" descr=""/>
+          <p:cNvPicPr/>
+          <p:nvPr/>
+        </p:nvPicPr>
+        <p:blipFill>
+          <a:blip r:embed="rId6"/>
+          <a:stretch/>
+        </p:blipFill>
+        <p:spPr>
+          <a:xfrm>
+            <a:off x="5393520" y="1955520"/>
+            <a:ext cx="2527560" cy="1932480"/>
+          </a:xfrm>
+          <a:prstGeom prst="rect">
+            <a:avLst/>
+          </a:prstGeom>
+          <a:ln>
+            <a:noFill/>
+          </a:ln>
+        </p:spPr>
+      </p:pic>
+      <p:pic>
+        <p:nvPicPr>
+          <p:cNvPr id="172" name="" descr=""/>
+          <p:cNvPicPr/>
+          <p:nvPr/>
+        </p:nvPicPr>
+        <p:blipFill>
+          <a:blip r:embed="rId7"/>
+          <a:stretch/>
+        </p:blipFill>
+        <p:spPr>
+          <a:xfrm>
+            <a:off x="135360" y="3816000"/>
+            <a:ext cx="2600640" cy="1800000"/>
+          </a:xfrm>
+          <a:prstGeom prst="rect">
+            <a:avLst/>
+          </a:prstGeom>
+          <a:ln>
+            <a:noFill/>
+          </a:ln>
+        </p:spPr>
+      </p:pic>
+      <p:pic>
+        <p:nvPicPr>
+          <p:cNvPr id="173" name="" descr=""/>
+          <p:cNvPicPr/>
+          <p:nvPr/>
+        </p:nvPicPr>
+        <p:blipFill>
+          <a:blip r:embed="rId8"/>
+          <a:stretch/>
+        </p:blipFill>
+        <p:spPr>
+          <a:xfrm>
+            <a:off x="2786760" y="3888000"/>
+            <a:ext cx="2712600" cy="1728000"/>
+          </a:xfrm>
+          <a:prstGeom prst="rect">
+            <a:avLst/>
+          </a:prstGeom>
+          <a:ln>
+            <a:noFill/>
+          </a:ln>
+        </p:spPr>
+      </p:pic>
+      <p:pic>
+        <p:nvPicPr>
+          <p:cNvPr id="174" name="" descr=""/>
+          <p:cNvPicPr/>
+          <p:nvPr/>
+        </p:nvPicPr>
+        <p:blipFill>
+          <a:blip r:embed="rId9"/>
+          <a:stretch/>
+        </p:blipFill>
+        <p:spPr>
+          <a:xfrm>
+            <a:off x="5436000" y="3844080"/>
+            <a:ext cx="2664360" cy="1771920"/>
+          </a:xfrm>
+          <a:prstGeom prst="rect">
+            <a:avLst/>
+          </a:prstGeom>
+          <a:ln>
+            <a:noFill/>
+          </a:ln>
+        </p:spPr>
+      </p:pic>
+      <p:pic>
+        <p:nvPicPr>
+          <p:cNvPr id="175" name="" descr=""/>
+          <p:cNvPicPr/>
+          <p:nvPr/>
+        </p:nvPicPr>
+        <p:blipFill>
+          <a:blip r:embed="rId10"/>
+          <a:stretch/>
+        </p:blipFill>
+        <p:spPr>
+          <a:xfrm>
+            <a:off x="7921080" y="1955520"/>
+            <a:ext cx="2159640" cy="1611360"/>
           </a:xfrm>
           <a:prstGeom prst="rect">
             <a:avLst/>
@@ -8723,7 +9025,7 @@
       </p:grpSpPr>
       <p:sp>
         <p:nvSpPr>
-          <p:cNvPr id="171" name="CustomShape 1"/>
+          <p:cNvPr id="176" name="CustomShape 1"/>
           <p:cNvSpPr/>
           <p:nvPr/>
         </p:nvSpPr>
@@ -8749,7 +9051,7 @@
       </p:sp>
       <p:sp>
         <p:nvSpPr>
-          <p:cNvPr id="172" name="CustomShape 2"/>
+          <p:cNvPr id="177" name="CustomShape 2"/>
           <p:cNvSpPr/>
           <p:nvPr/>
         </p:nvSpPr>
@@ -8786,7 +9088,7 @@
               <a:rPr b="0" lang="en-IN" sz="4400" spc="-1" strike="noStrike">
                 <a:latin typeface="Arial"/>
               </a:rPr>
-              <a:t>Layer 7</a:t>
+              <a:t>Layer 8</a:t>
             </a:r>
             <a:endParaRPr b="0" lang="en-IN" sz="4400" spc="-1" strike="noStrike">
               <a:latin typeface="Arial"/>
@@ -8796,13 +9098,13 @@
       </p:sp>
       <p:sp>
         <p:nvSpPr>
-          <p:cNvPr id="173" name="TextShape 3"/>
+          <p:cNvPr id="178" name="TextShape 3"/>
           <p:cNvSpPr txBox="1"/>
           <p:nvPr/>
         </p:nvSpPr>
         <p:spPr>
           <a:xfrm>
-            <a:off x="3456000" y="5017680"/>
+            <a:off x="3384000" y="4968000"/>
             <a:ext cx="3456000" cy="346320"/>
           </a:xfrm>
           <a:prstGeom prst="rect">
@@ -8822,7 +9124,7 @@
               <a:rPr b="0" lang="en-IN" sz="1800" spc="-1" strike="noStrike">
                 <a:latin typeface="Arial"/>
               </a:rPr>
-              <a:t>Hit Pattern in Oblong Layer</a:t>
+              <a:t>Hit Pattern in Cross Layer</a:t>
             </a:r>
             <a:endParaRPr b="0" lang="en-IN" sz="1800" spc="-1" strike="noStrike">
               <a:latin typeface="Arial"/>
@@ -8832,7 +9134,7 @@
       </p:sp>
       <p:sp>
         <p:nvSpPr>
-          <p:cNvPr id="174" name="TextShape 4"/>
+          <p:cNvPr id="179" name="TextShape 4"/>
           <p:cNvSpPr txBox="1"/>
           <p:nvPr/>
         </p:nvSpPr>
@@ -8888,7 +9190,7 @@
       </p:sp>
       <p:pic>
         <p:nvPicPr>
-          <p:cNvPr id="175" name="" descr=""/>
+          <p:cNvPr id="180" name="" descr=""/>
           <p:cNvPicPr/>
           <p:nvPr/>
         </p:nvPicPr>
@@ -8898,8 +9200,8 @@
         </p:blipFill>
         <p:spPr>
           <a:xfrm>
-            <a:off x="2232000" y="1266840"/>
-            <a:ext cx="4893480" cy="3750840"/>
+            <a:off x="1944000" y="1311840"/>
+            <a:ext cx="5472000" cy="3728160"/>
           </a:xfrm>
           <a:prstGeom prst="rect">
             <a:avLst/>

</xml_diff>